<commit_message>
- Se agregó la retrospectiva (Falta estilo!)
</commit_message>
<xml_diff>
--- a/Documentacion/Presentación Regularidad/Presentación Regularidad.pptx
+++ b/Documentacion/Presentación Regularidad/Presentación Regularidad.pptx
@@ -5,7 +5,7 @@
     <p:sldMasterId id="2147484788" r:id="rId1"/>
   </p:sldMasterIdLst>
   <p:notesMasterIdLst>
-    <p:notesMasterId r:id="rId13"/>
+    <p:notesMasterId r:id="rId14"/>
   </p:notesMasterIdLst>
   <p:sldIdLst>
     <p:sldId id="297" r:id="rId2"/>
@@ -16,9 +16,10 @@
     <p:sldId id="302" r:id="rId7"/>
     <p:sldId id="281" r:id="rId8"/>
     <p:sldId id="301" r:id="rId9"/>
-    <p:sldId id="303" r:id="rId10"/>
-    <p:sldId id="282" r:id="rId11"/>
-    <p:sldId id="274" r:id="rId12"/>
+    <p:sldId id="304" r:id="rId10"/>
+    <p:sldId id="303" r:id="rId11"/>
+    <p:sldId id="282" r:id="rId12"/>
+    <p:sldId id="274" r:id="rId13"/>
   </p:sldIdLst>
   <p:sldSz cx="12192000" cy="6858000"/>
   <p:notesSz cx="6858000" cy="9144000"/>
@@ -4336,6 +4337,90 @@
               <a:rPr lang="es-ES" smtClean="0"/>
               <a:t>11</a:t>
             </a:fld>
+            <a:endParaRPr lang="es-ES" dirty="0"/>
+          </a:p>
+        </p:txBody>
+      </p:sp>
+    </p:spTree>
+    <p:extLst>
+      <p:ext uri="{BB962C8B-B14F-4D97-AF65-F5344CB8AC3E}">
+        <p14:creationId xmlns:p14="http://schemas.microsoft.com/office/powerpoint/2010/main" val="2354830964"/>
+      </p:ext>
+    </p:extLst>
+  </p:cSld>
+  <p:clrMapOvr>
+    <a:masterClrMapping/>
+  </p:clrMapOvr>
+</p:notes>
+</file>
+
+<file path=ppt/notesSlides/notesSlide11.xml><?xml version="1.0" encoding="utf-8"?>
+<p:notes xmlns:a="http://schemas.openxmlformats.org/drawingml/2006/main" xmlns:r="http://schemas.openxmlformats.org/officeDocument/2006/relationships" xmlns:p="http://schemas.openxmlformats.org/presentationml/2006/main">
+  <p:cSld>
+    <p:spTree>
+      <p:nvGrpSpPr>
+        <p:cNvPr id="1" name=""/>
+        <p:cNvGrpSpPr/>
+        <p:nvPr/>
+      </p:nvGrpSpPr>
+      <p:grpSpPr>
+        <a:xfrm>
+          <a:off x="0" y="0"/>
+          <a:ext cx="0" cy="0"/>
+          <a:chOff x="0" y="0"/>
+          <a:chExt cx="0" cy="0"/>
+        </a:xfrm>
+      </p:grpSpPr>
+      <p:sp>
+        <p:nvSpPr>
+          <p:cNvPr id="2" name="Marcador de imagen de diapositiva 1"/>
+          <p:cNvSpPr>
+            <a:spLocks noGrp="1" noRot="1" noChangeAspect="1"/>
+          </p:cNvSpPr>
+          <p:nvPr>
+            <p:ph type="sldImg"/>
+          </p:nvPr>
+        </p:nvSpPr>
+        <p:spPr/>
+      </p:sp>
+      <p:sp>
+        <p:nvSpPr>
+          <p:cNvPr id="3" name="Marcador de notas 2"/>
+          <p:cNvSpPr>
+            <a:spLocks noGrp="1"/>
+          </p:cNvSpPr>
+          <p:nvPr>
+            <p:ph type="body" idx="1"/>
+          </p:nvPr>
+        </p:nvSpPr>
+        <p:spPr/>
+        <p:txBody>
+          <a:bodyPr/>
+          <a:lstStyle/>
+          <a:p>
+            <a:endParaRPr lang="es-ES" dirty="0"/>
+          </a:p>
+        </p:txBody>
+      </p:sp>
+      <p:sp>
+        <p:nvSpPr>
+          <p:cNvPr id="4" name="Marcador de número de diapositiva 3"/>
+          <p:cNvSpPr>
+            <a:spLocks noGrp="1"/>
+          </p:cNvSpPr>
+          <p:nvPr>
+            <p:ph type="sldNum" sz="quarter" idx="10"/>
+          </p:nvPr>
+        </p:nvSpPr>
+        <p:spPr/>
+        <p:txBody>
+          <a:bodyPr/>
+          <a:lstStyle/>
+          <a:p>
+            <a:fld id="{C1D7BF53-A8BD-41DF-AC66-90ABD219E666}" type="slidenum">
+              <a:rPr lang="es-ES" smtClean="0"/>
+              <a:t>12</a:t>
+            </a:fld>
             <a:endParaRPr lang="es-ES"/>
           </a:p>
         </p:txBody>
@@ -5761,6 +5846,221 @@
           <a:bodyPr/>
           <a:lstStyle/>
           <a:p>
+            <a:r>
+              <a:rPr lang="es-ES" dirty="0" smtClean="0"/>
+              <a:t>Administrar Campeonato: incluye gestionar</a:t>
+            </a:r>
+            <a:r>
+              <a:rPr lang="es-ES" baseline="0" dirty="0" smtClean="0"/>
+              <a:t> un campeonato y sus ediciones, tipos de cancha, generar distintas diagramaciones (fixture todos contra todos, por zonas, </a:t>
+            </a:r>
+            <a:r>
+              <a:rPr lang="es-ES" baseline="0" dirty="0" err="1" smtClean="0"/>
+              <a:t>etc</a:t>
+            </a:r>
+            <a:r>
+              <a:rPr lang="es-ES" baseline="0" dirty="0" smtClean="0"/>
+              <a:t>)</a:t>
+            </a:r>
+          </a:p>
+          <a:p>
+            <a:endParaRPr lang="es-ES" baseline="0" dirty="0" smtClean="0"/>
+          </a:p>
+          <a:p>
+            <a:r>
+              <a:rPr lang="es-ES" dirty="0" smtClean="0"/>
+              <a:t>Administrar</a:t>
+            </a:r>
+            <a:r>
+              <a:rPr lang="es-ES" baseline="0" dirty="0" smtClean="0"/>
+              <a:t> Partidos:</a:t>
+            </a:r>
+            <a:r>
+              <a:rPr lang="es-AR" sz="1200" kern="1200" dirty="0" smtClean="0">
+                <a:solidFill>
+                  <a:schemeClr val="tx1"/>
+                </a:solidFill>
+                <a:effectLst/>
+                <a:latin typeface="+mn-lt"/>
+                <a:ea typeface="+mn-ea"/>
+                <a:cs typeface="+mn-cs"/>
+              </a:rPr>
+              <a:t>Registrar resultado de los partidos: cantidad de goles convertidos, tipos de goles, tarjetas, tiempo de juego y faltas cometidas por jugador, desempeño de árbitros</a:t>
+            </a:r>
+          </a:p>
+          <a:p>
+            <a:endParaRPr lang="es-AR" sz="1200" kern="1200" dirty="0" smtClean="0">
+              <a:solidFill>
+                <a:schemeClr val="tx1"/>
+              </a:solidFill>
+              <a:effectLst/>
+              <a:latin typeface="+mn-lt"/>
+              <a:ea typeface="+mn-ea"/>
+              <a:cs typeface="+mn-cs"/>
+            </a:endParaRPr>
+          </a:p>
+          <a:p>
+            <a:pPr lvl="0"/>
+            <a:r>
+              <a:rPr lang="es-AR" sz="1200" kern="1200" dirty="0" smtClean="0">
+                <a:solidFill>
+                  <a:schemeClr val="tx1"/>
+                </a:solidFill>
+                <a:effectLst/>
+                <a:latin typeface="+mn-lt"/>
+                <a:ea typeface="+mn-ea"/>
+                <a:cs typeface="+mn-cs"/>
+              </a:rPr>
+              <a:t>Generar</a:t>
+            </a:r>
+            <a:r>
+              <a:rPr lang="es-AR" sz="1200" kern="1200" baseline="0" dirty="0" smtClean="0">
+                <a:solidFill>
+                  <a:schemeClr val="tx1"/>
+                </a:solidFill>
+                <a:effectLst/>
+                <a:latin typeface="+mn-lt"/>
+                <a:ea typeface="+mn-ea"/>
+                <a:cs typeface="+mn-cs"/>
+              </a:rPr>
+              <a:t> todo tipo de estadísticas</a:t>
+            </a:r>
+            <a:r>
+              <a:rPr lang="es-AR" sz="1200" kern="1200" dirty="0" smtClean="0">
+                <a:solidFill>
+                  <a:schemeClr val="tx1"/>
+                </a:solidFill>
+                <a:effectLst/>
+                <a:latin typeface="+mn-lt"/>
+                <a:ea typeface="+mn-ea"/>
+                <a:cs typeface="+mn-cs"/>
+              </a:rPr>
+              <a:t> por equipo: tabla de posiciones (partidos jugados, partidos ganados, partidos empatados, partidos perdidos, goles a favor, goles en contra, puntos obtenidos), tipo de goles convertidos, resultados de local y de visitante. </a:t>
+            </a:r>
+            <a:endParaRPr lang="es-ES" sz="1200" kern="1200" dirty="0" smtClean="0">
+              <a:solidFill>
+                <a:schemeClr val="tx1"/>
+              </a:solidFill>
+              <a:effectLst/>
+              <a:latin typeface="+mn-lt"/>
+              <a:ea typeface="+mn-ea"/>
+              <a:cs typeface="+mn-cs"/>
+            </a:endParaRPr>
+          </a:p>
+          <a:p>
+            <a:pPr lvl="0"/>
+            <a:r>
+              <a:rPr lang="es-AR" sz="1200" kern="1200" dirty="0" smtClean="0">
+                <a:solidFill>
+                  <a:schemeClr val="tx1"/>
+                </a:solidFill>
+                <a:effectLst/>
+                <a:latin typeface="+mn-lt"/>
+                <a:ea typeface="+mn-ea"/>
+                <a:cs typeface="+mn-cs"/>
+              </a:rPr>
+              <a:t>Consultar resultados por cada fecha.</a:t>
+            </a:r>
+            <a:endParaRPr lang="es-ES" sz="1200" kern="1200" dirty="0" smtClean="0">
+              <a:solidFill>
+                <a:schemeClr val="tx1"/>
+              </a:solidFill>
+              <a:effectLst/>
+              <a:latin typeface="+mn-lt"/>
+              <a:ea typeface="+mn-ea"/>
+              <a:cs typeface="+mn-cs"/>
+            </a:endParaRPr>
+          </a:p>
+          <a:p>
+            <a:pPr lvl="0"/>
+            <a:r>
+              <a:rPr lang="es-AR" sz="1200" kern="1200" dirty="0" smtClean="0">
+                <a:solidFill>
+                  <a:schemeClr val="tx1"/>
+                </a:solidFill>
+                <a:effectLst/>
+                <a:latin typeface="+mn-lt"/>
+                <a:ea typeface="+mn-ea"/>
+                <a:cs typeface="+mn-cs"/>
+              </a:rPr>
+              <a:t>Generación de estadísticas por jugador: ranking de jugadores, goleadores, tarjetas rojas y amarillas obtenidas.</a:t>
+            </a:r>
+            <a:endParaRPr lang="es-ES" sz="1200" kern="1200" dirty="0" smtClean="0">
+              <a:solidFill>
+                <a:schemeClr val="tx1"/>
+              </a:solidFill>
+              <a:effectLst/>
+              <a:latin typeface="+mn-lt"/>
+              <a:ea typeface="+mn-ea"/>
+              <a:cs typeface="+mn-cs"/>
+            </a:endParaRPr>
+          </a:p>
+          <a:p>
+            <a:endParaRPr lang="es-ES" dirty="0" smtClean="0"/>
+          </a:p>
+          <a:p>
+            <a:r>
+              <a:rPr lang="es-AR" sz="1200" kern="1200" dirty="0" smtClean="0">
+                <a:solidFill>
+                  <a:schemeClr val="tx1"/>
+                </a:solidFill>
+                <a:effectLst/>
+                <a:latin typeface="+mn-lt"/>
+                <a:ea typeface="+mn-ea"/>
+                <a:cs typeface="+mn-cs"/>
+              </a:rPr>
+              <a:t>Generación de un portal de noticias que cada torneo podrá administrar.</a:t>
+            </a:r>
+          </a:p>
+          <a:p>
+            <a:endParaRPr lang="es-AR" sz="1200" kern="1200" dirty="0" smtClean="0">
+              <a:solidFill>
+                <a:schemeClr val="tx1"/>
+              </a:solidFill>
+              <a:effectLst/>
+              <a:latin typeface="+mn-lt"/>
+              <a:ea typeface="+mn-ea"/>
+              <a:cs typeface="+mn-cs"/>
+            </a:endParaRPr>
+          </a:p>
+          <a:p>
+            <a:r>
+              <a:rPr lang="es-AR" sz="1200" kern="1200" dirty="0" smtClean="0">
+                <a:solidFill>
+                  <a:schemeClr val="tx1"/>
+                </a:solidFill>
+                <a:effectLst/>
+                <a:latin typeface="+mn-lt"/>
+                <a:ea typeface="+mn-ea"/>
+                <a:cs typeface="+mn-cs"/>
+              </a:rPr>
+              <a:t>Gestión de usuarios, administrar los distintos accesos</a:t>
+            </a:r>
+            <a:r>
+              <a:rPr lang="es-AR" sz="1200" kern="1200" baseline="0" dirty="0" smtClean="0">
+                <a:solidFill>
+                  <a:schemeClr val="tx1"/>
+                </a:solidFill>
+                <a:effectLst/>
+                <a:latin typeface="+mn-lt"/>
+                <a:ea typeface="+mn-ea"/>
+                <a:cs typeface="+mn-cs"/>
+              </a:rPr>
+              <a:t> a la información, para cada tipo de usuario.</a:t>
+            </a:r>
+          </a:p>
+          <a:p>
+            <a:endParaRPr lang="es-AR" sz="1200" kern="1200" baseline="0" dirty="0" smtClean="0">
+              <a:solidFill>
+                <a:schemeClr val="tx1"/>
+              </a:solidFill>
+              <a:effectLst/>
+              <a:latin typeface="+mn-lt"/>
+              <a:ea typeface="+mn-ea"/>
+              <a:cs typeface="+mn-cs"/>
+            </a:endParaRPr>
+          </a:p>
+          <a:p>
             <a:endParaRPr lang="es-ES" dirty="0"/>
           </a:p>
         </p:txBody>
@@ -5784,14 +6084,14 @@
               <a:rPr lang="es-ES" smtClean="0"/>
               <a:t>9</a:t>
             </a:fld>
-            <a:endParaRPr lang="es-ES" dirty="0"/>
+            <a:endParaRPr lang="es-ES"/>
           </a:p>
         </p:txBody>
       </p:sp>
     </p:spTree>
     <p:extLst>
       <p:ext uri="{BB962C8B-B14F-4D97-AF65-F5344CB8AC3E}">
-        <p14:creationId xmlns:p14="http://schemas.microsoft.com/office/powerpoint/2010/main" val="43387650"/>
+        <p14:creationId xmlns:p14="http://schemas.microsoft.com/office/powerpoint/2010/main" val="1485502202"/>
       </p:ext>
     </p:extLst>
   </p:cSld>
@@ -5875,7 +6175,7 @@
     </p:spTree>
     <p:extLst>
       <p:ext uri="{BB962C8B-B14F-4D97-AF65-F5344CB8AC3E}">
-        <p14:creationId xmlns:p14="http://schemas.microsoft.com/office/powerpoint/2010/main" val="2354830964"/>
+        <p14:creationId xmlns:p14="http://schemas.microsoft.com/office/powerpoint/2010/main" val="43387650"/>
       </p:ext>
     </p:extLst>
   </p:cSld>
@@ -12933,6 +13233,679 @@
       </p:grpSpPr>
       <p:sp>
         <p:nvSpPr>
+          <p:cNvPr id="26" name="Rectángulo 25"/>
+          <p:cNvSpPr/>
+          <p:nvPr/>
+        </p:nvSpPr>
+        <p:spPr>
+          <a:xfrm>
+            <a:off x="1" y="1"/>
+            <a:ext cx="10444162" cy="1152000"/>
+          </a:xfrm>
+          <a:prstGeom prst="rect">
+            <a:avLst/>
+          </a:prstGeom>
+          <a:solidFill>
+            <a:schemeClr val="accent1">
+              <a:alpha val="37000"/>
+            </a:schemeClr>
+          </a:solidFill>
+          <a:ln>
+            <a:noFill/>
+          </a:ln>
+          <a:effectLst>
+            <a:outerShdw blurRad="50800" dist="38100" dir="2700000" algn="tl" rotWithShape="0">
+              <a:prstClr val="black">
+                <a:alpha val="40000"/>
+              </a:prstClr>
+            </a:outerShdw>
+          </a:effectLst>
+        </p:spPr>
+        <p:style>
+          <a:lnRef idx="2">
+            <a:schemeClr val="accent1">
+              <a:shade val="50000"/>
+            </a:schemeClr>
+          </a:lnRef>
+          <a:fillRef idx="1">
+            <a:schemeClr val="accent1"/>
+          </a:fillRef>
+          <a:effectRef idx="0">
+            <a:schemeClr val="accent1"/>
+          </a:effectRef>
+          <a:fontRef idx="minor">
+            <a:schemeClr val="lt1"/>
+          </a:fontRef>
+        </p:style>
+        <p:txBody>
+          <a:bodyPr rtlCol="0" anchor="ctr"/>
+          <a:lstStyle/>
+          <a:p>
+            <a:pPr algn="ctr"/>
+            <a:endParaRPr lang="es-ES"/>
+          </a:p>
+        </p:txBody>
+      </p:sp>
+      <p:sp>
+        <p:nvSpPr>
+          <p:cNvPr id="28" name="Título 1"/>
+          <p:cNvSpPr txBox="1">
+            <a:spLocks/>
+          </p:cNvSpPr>
+          <p:nvPr/>
+        </p:nvSpPr>
+        <p:spPr>
+          <a:xfrm>
+            <a:off x="1607517" y="228600"/>
+            <a:ext cx="8836646" cy="813148"/>
+          </a:xfrm>
+          <a:prstGeom prst="rect">
+            <a:avLst/>
+          </a:prstGeom>
+        </p:spPr>
+        <p:txBody>
+          <a:bodyPr vert="horz" lIns="91440" tIns="45720" rIns="91440" bIns="45720" rtlCol="0" anchor="t">
+            <a:noAutofit/>
+          </a:bodyPr>
+          <a:lstStyle>
+            <a:lvl1pPr algn="l" defTabSz="457200" rtl="0" eaLnBrk="1" latinLnBrk="0" hangingPunct="1">
+              <a:spcBef>
+                <a:spcPct val="0"/>
+              </a:spcBef>
+              <a:buNone/>
+              <a:defRPr sz="4200" b="0" i="0" kern="1200">
+                <a:solidFill>
+                  <a:schemeClr val="tx2"/>
+                </a:solidFill>
+                <a:latin typeface="+mj-lt"/>
+                <a:ea typeface="+mj-ea"/>
+                <a:cs typeface="+mj-cs"/>
+              </a:defRPr>
+            </a:lvl1pPr>
+            <a:lvl2pPr eaLnBrk="1" hangingPunct="1">
+              <a:defRPr>
+                <a:solidFill>
+                  <a:schemeClr val="tx2"/>
+                </a:solidFill>
+              </a:defRPr>
+            </a:lvl2pPr>
+            <a:lvl3pPr eaLnBrk="1" hangingPunct="1">
+              <a:defRPr>
+                <a:solidFill>
+                  <a:schemeClr val="tx2"/>
+                </a:solidFill>
+              </a:defRPr>
+            </a:lvl3pPr>
+            <a:lvl4pPr eaLnBrk="1" hangingPunct="1">
+              <a:defRPr>
+                <a:solidFill>
+                  <a:schemeClr val="tx2"/>
+                </a:solidFill>
+              </a:defRPr>
+            </a:lvl4pPr>
+            <a:lvl5pPr eaLnBrk="1" hangingPunct="1">
+              <a:defRPr>
+                <a:solidFill>
+                  <a:schemeClr val="tx2"/>
+                </a:solidFill>
+              </a:defRPr>
+            </a:lvl5pPr>
+            <a:lvl6pPr eaLnBrk="1" hangingPunct="1">
+              <a:defRPr>
+                <a:solidFill>
+                  <a:schemeClr val="tx2"/>
+                </a:solidFill>
+              </a:defRPr>
+            </a:lvl6pPr>
+            <a:lvl7pPr eaLnBrk="1" hangingPunct="1">
+              <a:defRPr>
+                <a:solidFill>
+                  <a:schemeClr val="tx2"/>
+                </a:solidFill>
+              </a:defRPr>
+            </a:lvl7pPr>
+            <a:lvl8pPr eaLnBrk="1" hangingPunct="1">
+              <a:defRPr>
+                <a:solidFill>
+                  <a:schemeClr val="tx2"/>
+                </a:solidFill>
+              </a:defRPr>
+            </a:lvl8pPr>
+            <a:lvl9pPr eaLnBrk="1" hangingPunct="1">
+              <a:defRPr>
+                <a:solidFill>
+                  <a:schemeClr val="tx2"/>
+                </a:solidFill>
+              </a:defRPr>
+            </a:lvl9pPr>
+          </a:lstStyle>
+          <a:p>
+            <a:r>
+              <a:rPr lang="es-AR" dirty="0" smtClean="0"/>
+              <a:t>Demo del sistema</a:t>
+            </a:r>
+            <a:endParaRPr lang="es-AR" dirty="0"/>
+          </a:p>
+        </p:txBody>
+      </p:sp>
+      <p:pic>
+        <p:nvPicPr>
+          <p:cNvPr id="29" name="Imagen 28"/>
+          <p:cNvPicPr>
+            <a:picLocks noChangeAspect="1"/>
+          </p:cNvPicPr>
+          <p:nvPr/>
+        </p:nvPicPr>
+        <p:blipFill>
+          <a:blip r:embed="rId3">
+            <a:grayscl/>
+            <a:extLst>
+              <a:ext uri="{28A0092B-C50C-407E-A947-70E740481C1C}">
+                <a14:useLocalDpi xmlns:a14="http://schemas.microsoft.com/office/drawing/2010/main" val="0"/>
+              </a:ext>
+            </a:extLst>
+          </a:blip>
+          <a:stretch>
+            <a:fillRect/>
+          </a:stretch>
+        </p:blipFill>
+        <p:spPr>
+          <a:xfrm>
+            <a:off x="289301" y="0"/>
+            <a:ext cx="1151372" cy="1163031"/>
+          </a:xfrm>
+          <a:prstGeom prst="rect">
+            <a:avLst/>
+          </a:prstGeom>
+        </p:spPr>
+      </p:pic>
+      <p:sp>
+        <p:nvSpPr>
+          <p:cNvPr id="46" name="Título 1"/>
+          <p:cNvSpPr txBox="1">
+            <a:spLocks/>
+          </p:cNvSpPr>
+          <p:nvPr/>
+        </p:nvSpPr>
+        <p:spPr>
+          <a:xfrm>
+            <a:off x="2061029" y="2257795"/>
+            <a:ext cx="8157028" cy="2342410"/>
+          </a:xfrm>
+          <a:prstGeom prst="rect">
+            <a:avLst/>
+          </a:prstGeom>
+          <a:effectLst>
+            <a:outerShdw blurRad="50800" dir="14400000">
+              <a:srgbClr val="000000">
+                <a:alpha val="60000"/>
+              </a:srgbClr>
+            </a:outerShdw>
+          </a:effectLst>
+        </p:spPr>
+        <p:txBody>
+          <a:bodyPr vert="horz" lIns="91440" tIns="45720" rIns="91440" bIns="45720" rtlCol="0" anchor="b">
+            <a:noAutofit/>
+          </a:bodyPr>
+          <a:lstStyle>
+            <a:lvl1pPr algn="l" defTabSz="457200" rtl="0" eaLnBrk="1" latinLnBrk="0" hangingPunct="1">
+              <a:spcBef>
+                <a:spcPct val="0"/>
+              </a:spcBef>
+              <a:buNone/>
+              <a:defRPr sz="5400" b="1" kern="1200">
+                <a:solidFill>
+                  <a:srgbClr val="FEFEFE"/>
+                </a:solidFill>
+                <a:latin typeface="+mj-lt"/>
+                <a:ea typeface="+mj-ea"/>
+                <a:cs typeface="+mj-cs"/>
+              </a:defRPr>
+            </a:lvl1pPr>
+            <a:lvl2pPr eaLnBrk="1" hangingPunct="1">
+              <a:defRPr>
+                <a:solidFill>
+                  <a:schemeClr val="tx2"/>
+                </a:solidFill>
+              </a:defRPr>
+            </a:lvl2pPr>
+            <a:lvl3pPr eaLnBrk="1" hangingPunct="1">
+              <a:defRPr>
+                <a:solidFill>
+                  <a:schemeClr val="tx2"/>
+                </a:solidFill>
+              </a:defRPr>
+            </a:lvl3pPr>
+            <a:lvl4pPr eaLnBrk="1" hangingPunct="1">
+              <a:defRPr>
+                <a:solidFill>
+                  <a:schemeClr val="tx2"/>
+                </a:solidFill>
+              </a:defRPr>
+            </a:lvl4pPr>
+            <a:lvl5pPr eaLnBrk="1" hangingPunct="1">
+              <a:defRPr>
+                <a:solidFill>
+                  <a:schemeClr val="tx2"/>
+                </a:solidFill>
+              </a:defRPr>
+            </a:lvl5pPr>
+            <a:lvl6pPr eaLnBrk="1" hangingPunct="1">
+              <a:defRPr>
+                <a:solidFill>
+                  <a:schemeClr val="tx2"/>
+                </a:solidFill>
+              </a:defRPr>
+            </a:lvl6pPr>
+            <a:lvl7pPr eaLnBrk="1" hangingPunct="1">
+              <a:defRPr>
+                <a:solidFill>
+                  <a:schemeClr val="tx2"/>
+                </a:solidFill>
+              </a:defRPr>
+            </a:lvl7pPr>
+            <a:lvl8pPr eaLnBrk="1" hangingPunct="1">
+              <a:defRPr>
+                <a:solidFill>
+                  <a:schemeClr val="tx2"/>
+                </a:solidFill>
+              </a:defRPr>
+            </a:lvl8pPr>
+            <a:lvl9pPr eaLnBrk="1" hangingPunct="1">
+              <a:defRPr>
+                <a:solidFill>
+                  <a:schemeClr val="tx2"/>
+                </a:solidFill>
+              </a:defRPr>
+            </a:lvl9pPr>
+          </a:lstStyle>
+          <a:p>
+            <a:pPr algn="ctr"/>
+            <a:r>
+              <a:rPr lang="es-AR" sz="7200" spc="300" dirty="0" smtClean="0">
+                <a:solidFill>
+                  <a:schemeClr val="tx1"/>
+                </a:solidFill>
+                <a:effectLst>
+                  <a:outerShdw blurRad="38100" dist="38100" dir="2700000" algn="tl">
+                    <a:srgbClr val="000000">
+                      <a:alpha val="43137"/>
+                    </a:srgbClr>
+                  </a:outerShdw>
+                </a:effectLst>
+              </a:rPr>
+              <a:t>Presentación de Funcionalidad </a:t>
+            </a:r>
+            <a:endParaRPr lang="es-AR" sz="7200" spc="300" dirty="0">
+              <a:solidFill>
+                <a:schemeClr val="tx1"/>
+              </a:solidFill>
+              <a:effectLst>
+                <a:outerShdw blurRad="38100" dist="38100" dir="2700000" algn="tl">
+                  <a:srgbClr val="000000">
+                    <a:alpha val="43137"/>
+                  </a:srgbClr>
+                </a:outerShdw>
+              </a:effectLst>
+            </a:endParaRPr>
+          </a:p>
+        </p:txBody>
+      </p:sp>
+      <p:sp>
+        <p:nvSpPr>
+          <p:cNvPr id="47" name="Left Bracket"/>
+          <p:cNvSpPr txBox="1"/>
+          <p:nvPr/>
+        </p:nvSpPr>
+        <p:spPr>
+          <a:xfrm>
+            <a:off x="5163590" y="1741534"/>
+            <a:ext cx="1080745" cy="3154710"/>
+          </a:xfrm>
+          <a:prstGeom prst="rect">
+            <a:avLst/>
+          </a:prstGeom>
+          <a:noFill/>
+        </p:spPr>
+        <p:txBody>
+          <a:bodyPr wrap="none" rtlCol="0">
+            <a:spAutoFit/>
+          </a:bodyPr>
+          <a:lstStyle/>
+          <a:p>
+            <a:r>
+              <a:rPr lang="en-US" sz="19900" dirty="0" smtClean="0">
+                <a:solidFill>
+                  <a:schemeClr val="tx1">
+                    <a:lumMod val="95000"/>
+                  </a:schemeClr>
+                </a:solidFill>
+                <a:effectLst>
+                  <a:outerShdw blurRad="38100" dist="38100" dir="2700000" algn="tl">
+                    <a:srgbClr val="000000">
+                      <a:alpha val="43137"/>
+                    </a:srgbClr>
+                  </a:outerShdw>
+                </a:effectLst>
+              </a:rPr>
+              <a:t>[</a:t>
+            </a:r>
+            <a:endParaRPr lang="en-US" sz="19900" dirty="0">
+              <a:solidFill>
+                <a:schemeClr val="tx1">
+                  <a:lumMod val="95000"/>
+                </a:schemeClr>
+              </a:solidFill>
+              <a:effectLst>
+                <a:outerShdw blurRad="38100" dist="38100" dir="2700000" algn="tl">
+                  <a:srgbClr val="000000">
+                    <a:alpha val="43137"/>
+                  </a:srgbClr>
+                </a:outerShdw>
+              </a:effectLst>
+            </a:endParaRPr>
+          </a:p>
+        </p:txBody>
+      </p:sp>
+      <p:sp>
+        <p:nvSpPr>
+          <p:cNvPr id="48" name="Right Bracket"/>
+          <p:cNvSpPr txBox="1"/>
+          <p:nvPr/>
+        </p:nvSpPr>
+        <p:spPr>
+          <a:xfrm>
+            <a:off x="6230113" y="1741534"/>
+            <a:ext cx="1080745" cy="3154710"/>
+          </a:xfrm>
+          <a:prstGeom prst="rect">
+            <a:avLst/>
+          </a:prstGeom>
+          <a:noFill/>
+        </p:spPr>
+        <p:txBody>
+          <a:bodyPr wrap="none" rtlCol="0">
+            <a:spAutoFit/>
+          </a:bodyPr>
+          <a:lstStyle/>
+          <a:p>
+            <a:r>
+              <a:rPr lang="en-US" sz="19900" dirty="0">
+                <a:solidFill>
+                  <a:schemeClr val="tx1">
+                    <a:lumMod val="95000"/>
+                  </a:schemeClr>
+                </a:solidFill>
+                <a:effectLst>
+                  <a:outerShdw blurRad="38100" dist="38100" dir="2700000" algn="tl">
+                    <a:srgbClr val="000000">
+                      <a:alpha val="43137"/>
+                    </a:srgbClr>
+                  </a:outerShdw>
+                </a:effectLst>
+              </a:rPr>
+              <a:t>]</a:t>
+            </a:r>
+          </a:p>
+        </p:txBody>
+      </p:sp>
+    </p:spTree>
+    <p:extLst>
+      <p:ext uri="{BB962C8B-B14F-4D97-AF65-F5344CB8AC3E}">
+        <p14:creationId xmlns:p14="http://schemas.microsoft.com/office/powerpoint/2010/main" val="3189637303"/>
+      </p:ext>
+    </p:extLst>
+  </p:cSld>
+  <p:clrMapOvr>
+    <a:masterClrMapping/>
+  </p:clrMapOvr>
+  <mc:AlternateContent xmlns:mc="http://schemas.openxmlformats.org/markup-compatibility/2006" xmlns:p14="http://schemas.microsoft.com/office/powerpoint/2010/main">
+    <mc:Choice Requires="p14">
+      <p:transition spd="slow" p14:dur="800">
+        <p14:flythrough/>
+      </p:transition>
+    </mc:Choice>
+    <mc:Fallback xmlns="">
+      <p:transition spd="slow">
+        <p:fade/>
+      </p:transition>
+    </mc:Fallback>
+  </mc:AlternateContent>
+  <p:timing>
+    <p:tnLst>
+      <p:par>
+        <p:cTn id="1" dur="indefinite" restart="never" nodeType="tmRoot">
+          <p:childTnLst>
+            <p:seq concurrent="1" nextAc="seek">
+              <p:cTn id="2" dur="indefinite" nodeType="mainSeq">
+                <p:childTnLst>
+                  <p:par>
+                    <p:cTn id="3" fill="hold">
+                      <p:stCondLst>
+                        <p:cond delay="indefinite"/>
+                      </p:stCondLst>
+                      <p:childTnLst>
+                        <p:par>
+                          <p:cTn id="4" fill="hold">
+                            <p:stCondLst>
+                              <p:cond delay="0"/>
+                            </p:stCondLst>
+                            <p:childTnLst>
+                              <p:par>
+                                <p:cTn id="5" presetID="10" presetClass="entr" presetSubtype="0" fill="hold" grpId="0" nodeType="clickEffect">
+                                  <p:stCondLst>
+                                    <p:cond delay="500"/>
+                                  </p:stCondLst>
+                                  <p:childTnLst>
+                                    <p:set>
+                                      <p:cBhvr>
+                                        <p:cTn id="6" dur="1" fill="hold">
+                                          <p:stCondLst>
+                                            <p:cond delay="0"/>
+                                          </p:stCondLst>
+                                        </p:cTn>
+                                        <p:tgtEl>
+                                          <p:spTgt spid="48"/>
+                                        </p:tgtEl>
+                                        <p:attrNameLst>
+                                          <p:attrName>style.visibility</p:attrName>
+                                        </p:attrNameLst>
+                                      </p:cBhvr>
+                                      <p:to>
+                                        <p:strVal val="visible"/>
+                                      </p:to>
+                                    </p:set>
+                                    <p:animEffect transition="in" filter="fade">
+                                      <p:cBhvr>
+                                        <p:cTn id="7" dur="500"/>
+                                        <p:tgtEl>
+                                          <p:spTgt spid="48"/>
+                                        </p:tgtEl>
+                                      </p:cBhvr>
+                                    </p:animEffect>
+                                  </p:childTnLst>
+                                </p:cTn>
+                              </p:par>
+                              <p:par>
+                                <p:cTn id="8" presetID="10" presetClass="entr" presetSubtype="0" fill="hold" grpId="1" nodeType="withEffect">
+                                  <p:stCondLst>
+                                    <p:cond delay="500"/>
+                                  </p:stCondLst>
+                                  <p:childTnLst>
+                                    <p:set>
+                                      <p:cBhvr>
+                                        <p:cTn id="9" dur="1" fill="hold">
+                                          <p:stCondLst>
+                                            <p:cond delay="0"/>
+                                          </p:stCondLst>
+                                        </p:cTn>
+                                        <p:tgtEl>
+                                          <p:spTgt spid="47"/>
+                                        </p:tgtEl>
+                                        <p:attrNameLst>
+                                          <p:attrName>style.visibility</p:attrName>
+                                        </p:attrNameLst>
+                                      </p:cBhvr>
+                                      <p:to>
+                                        <p:strVal val="visible"/>
+                                      </p:to>
+                                    </p:set>
+                                    <p:animEffect transition="in" filter="fade">
+                                      <p:cBhvr>
+                                        <p:cTn id="10" dur="500"/>
+                                        <p:tgtEl>
+                                          <p:spTgt spid="47"/>
+                                        </p:tgtEl>
+                                      </p:cBhvr>
+                                    </p:animEffect>
+                                  </p:childTnLst>
+                                </p:cTn>
+                              </p:par>
+                            </p:childTnLst>
+                          </p:cTn>
+                        </p:par>
+                        <p:par>
+                          <p:cTn id="11" fill="hold">
+                            <p:stCondLst>
+                              <p:cond delay="1000"/>
+                            </p:stCondLst>
+                            <p:childTnLst>
+                              <p:par>
+                                <p:cTn id="12" presetID="42" presetClass="path" presetSubtype="0" accel="50000" decel="50000" fill="hold" grpId="0" nodeType="afterEffect">
+                                  <p:stCondLst>
+                                    <p:cond delay="0"/>
+                                  </p:stCondLst>
+                                  <p:childTnLst>
+                                    <p:animMotion origin="layout" path="M 1.45833E-6 3.7037E-6 L -0.3069 -0.00324 " pathEditMode="relative" rAng="0" ptsTypes="AA">
+                                      <p:cBhvr>
+                                        <p:cTn id="13" dur="1000" fill="hold"/>
+                                        <p:tgtEl>
+                                          <p:spTgt spid="47"/>
+                                        </p:tgtEl>
+                                        <p:attrNameLst>
+                                          <p:attrName>ppt_x</p:attrName>
+                                          <p:attrName>ppt_y</p:attrName>
+                                        </p:attrNameLst>
+                                      </p:cBhvr>
+                                      <p:rCtr x="-15352" y="-162"/>
+                                    </p:animMotion>
+                                  </p:childTnLst>
+                                </p:cTn>
+                              </p:par>
+                              <p:par>
+                                <p:cTn id="14" presetID="42" presetClass="path" presetSubtype="0" accel="50000" decel="50000" fill="hold" grpId="1" nodeType="withEffect">
+                                  <p:stCondLst>
+                                    <p:cond delay="0"/>
+                                  </p:stCondLst>
+                                  <p:childTnLst>
+                                    <p:animMotion origin="layout" path="M 1.66667E-6 3.7037E-6 L 0.28698 0.00231 " pathEditMode="relative" rAng="0" ptsTypes="AA">
+                                      <p:cBhvr>
+                                        <p:cTn id="15" dur="1100" fill="hold"/>
+                                        <p:tgtEl>
+                                          <p:spTgt spid="48"/>
+                                        </p:tgtEl>
+                                        <p:attrNameLst>
+                                          <p:attrName>ppt_x</p:attrName>
+                                          <p:attrName>ppt_y</p:attrName>
+                                        </p:attrNameLst>
+                                      </p:cBhvr>
+                                      <p:rCtr x="14349" y="116"/>
+                                    </p:animMotion>
+                                  </p:childTnLst>
+                                </p:cTn>
+                              </p:par>
+                              <p:par>
+                                <p:cTn id="16" presetID="16" presetClass="entr" presetSubtype="37" fill="hold" grpId="0" nodeType="withEffect">
+                                  <p:stCondLst>
+                                    <p:cond delay="200"/>
+                                  </p:stCondLst>
+                                  <p:childTnLst>
+                                    <p:set>
+                                      <p:cBhvr>
+                                        <p:cTn id="17" dur="1" fill="hold">
+                                          <p:stCondLst>
+                                            <p:cond delay="0"/>
+                                          </p:stCondLst>
+                                        </p:cTn>
+                                        <p:tgtEl>
+                                          <p:spTgt spid="46"/>
+                                        </p:tgtEl>
+                                        <p:attrNameLst>
+                                          <p:attrName>style.visibility</p:attrName>
+                                        </p:attrNameLst>
+                                      </p:cBhvr>
+                                      <p:to>
+                                        <p:strVal val="visible"/>
+                                      </p:to>
+                                    </p:set>
+                                    <p:animEffect transition="in" filter="barn(outVertical)">
+                                      <p:cBhvr>
+                                        <p:cTn id="18" dur="800"/>
+                                        <p:tgtEl>
+                                          <p:spTgt spid="46"/>
+                                        </p:tgtEl>
+                                      </p:cBhvr>
+                                    </p:animEffect>
+                                  </p:childTnLst>
+                                </p:cTn>
+                              </p:par>
+                            </p:childTnLst>
+                          </p:cTn>
+                        </p:par>
+                      </p:childTnLst>
+                    </p:cTn>
+                  </p:par>
+                </p:childTnLst>
+              </p:cTn>
+              <p:prevCondLst>
+                <p:cond evt="onPrev" delay="0">
+                  <p:tgtEl>
+                    <p:sldTgt/>
+                  </p:tgtEl>
+                </p:cond>
+              </p:prevCondLst>
+              <p:nextCondLst>
+                <p:cond evt="onNext" delay="0">
+                  <p:tgtEl>
+                    <p:sldTgt/>
+                  </p:tgtEl>
+                </p:cond>
+              </p:nextCondLst>
+            </p:seq>
+          </p:childTnLst>
+        </p:cTn>
+      </p:par>
+    </p:tnLst>
+    <p:bldLst>
+      <p:bldP spid="46" grpId="0"/>
+      <p:bldP spid="47" grpId="0"/>
+      <p:bldP spid="47" grpId="1"/>
+      <p:bldP spid="48" grpId="0"/>
+      <p:bldP spid="48" grpId="1"/>
+    </p:bldLst>
+  </p:timing>
+</p:sld>
+</file>
+
+<file path=ppt/slides/slide11.xml><?xml version="1.0" encoding="utf-8"?>
+<p:sld xmlns:a="http://schemas.openxmlformats.org/drawingml/2006/main" xmlns:r="http://schemas.openxmlformats.org/officeDocument/2006/relationships" xmlns:p="http://schemas.openxmlformats.org/presentationml/2006/main">
+  <p:cSld>
+    <p:spTree>
+      <p:nvGrpSpPr>
+        <p:cNvPr id="1" name=""/>
+        <p:cNvGrpSpPr/>
+        <p:nvPr/>
+      </p:nvGrpSpPr>
+      <p:grpSpPr>
+        <a:xfrm>
+          <a:off x="0" y="0"/>
+          <a:ext cx="0" cy="0"/>
+          <a:chOff x="0" y="0"/>
+          <a:chExt cx="0" cy="0"/>
+        </a:xfrm>
+      </p:grpSpPr>
+      <p:sp>
+        <p:nvSpPr>
           <p:cNvPr id="2" name="Título 1"/>
           <p:cNvSpPr>
             <a:spLocks noGrp="1"/>
@@ -13593,10 +14566,10 @@
         </p:nvGrpSpPr>
         <p:grpSpPr>
           <a:xfrm>
-            <a:off x="5958592" y="4727530"/>
-            <a:ext cx="2436795" cy="881611"/>
-            <a:chOff x="709557" y="2186610"/>
-            <a:chExt cx="2061498" cy="710591"/>
+            <a:off x="6002516" y="4727530"/>
+            <a:ext cx="2392871" cy="881611"/>
+            <a:chOff x="746716" y="2186610"/>
+            <a:chExt cx="2024339" cy="710591"/>
           </a:xfrm>
         </p:grpSpPr>
         <p:sp>
@@ -13652,7 +14625,7 @@
           </p:nvSpPr>
           <p:spPr>
             <a:xfrm>
-              <a:off x="709557" y="2266911"/>
+              <a:off x="746716" y="2286054"/>
               <a:ext cx="2005471" cy="598724"/>
             </a:xfrm>
             <a:prstGeom prst="rect">
@@ -14270,7 +15243,7 @@
 </p:sld>
 </file>
 
-<file path=ppt/slides/slide11.xml><?xml version="1.0" encoding="utf-8"?>
+<file path=ppt/slides/slide12.xml><?xml version="1.0" encoding="utf-8"?>
 <p:sld xmlns:a="http://schemas.openxmlformats.org/drawingml/2006/main" xmlns:r="http://schemas.openxmlformats.org/officeDocument/2006/relationships" xmlns:p="http://schemas.openxmlformats.org/presentationml/2006/main">
   <p:cSld>
     <p:spTree>
@@ -21893,27 +22866,7 @@
                   </a:schemeClr>
                 </a:solidFill>
               </a:rPr>
-              <a:t>Encriptado de </a:t>
-            </a:r>
-            <a:r>
-              <a:rPr lang="es-AR" sz="2400" dirty="0" smtClean="0">
-                <a:solidFill>
-                  <a:schemeClr val="tx1">
-                    <a:lumMod val="85000"/>
-                  </a:schemeClr>
-                </a:solidFill>
-              </a:rPr>
-              <a:t>Contraseña, Validación de Mail, Activación y Recuperación </a:t>
-            </a:r>
-            <a:r>
-              <a:rPr lang="es-AR" sz="2400" dirty="0" smtClean="0">
-                <a:solidFill>
-                  <a:schemeClr val="tx1">
-                    <a:lumMod val="85000"/>
-                  </a:schemeClr>
-                </a:solidFill>
-              </a:rPr>
-              <a:t>de Cuenta.</a:t>
+              <a:t>Encriptado de Contraseña, Validación de Mail, Activación y Recuperación de Cuenta.</a:t>
             </a:r>
             <a:endParaRPr lang="es-ES" sz="2400" dirty="0">
               <a:solidFill>
@@ -26268,7 +27221,7 @@
       </p:grpSpPr>
       <p:sp>
         <p:nvSpPr>
-          <p:cNvPr id="26" name="Rectángulo 25"/>
+          <p:cNvPr id="55" name="Rectángulo 54"/>
           <p:cNvSpPr/>
           <p:nvPr/>
         </p:nvSpPr>
@@ -26323,109 +27276,39 @@
       </p:sp>
       <p:sp>
         <p:nvSpPr>
-          <p:cNvPr id="28" name="Título 1"/>
-          <p:cNvSpPr txBox="1">
-            <a:spLocks/>
+          <p:cNvPr id="2" name="Título 1"/>
+          <p:cNvSpPr>
+            <a:spLocks noGrp="1"/>
           </p:cNvSpPr>
-          <p:nvPr/>
+          <p:nvPr>
+            <p:ph type="title"/>
+          </p:nvPr>
         </p:nvSpPr>
         <p:spPr>
           <a:xfrm>
-            <a:off x="1607517" y="228600"/>
-            <a:ext cx="8836646" cy="813148"/>
+            <a:off x="1695449" y="192581"/>
+            <a:ext cx="7600952" cy="783264"/>
           </a:xfrm>
-          <a:prstGeom prst="rect">
-            <a:avLst/>
-          </a:prstGeom>
         </p:spPr>
         <p:txBody>
-          <a:bodyPr vert="horz" lIns="91440" tIns="45720" rIns="91440" bIns="45720" rtlCol="0" anchor="t">
-            <a:noAutofit/>
-          </a:bodyPr>
-          <a:lstStyle>
-            <a:lvl1pPr algn="l" defTabSz="457200" rtl="0" eaLnBrk="1" latinLnBrk="0" hangingPunct="1">
-              <a:spcBef>
-                <a:spcPct val="0"/>
-              </a:spcBef>
-              <a:buNone/>
-              <a:defRPr sz="4200" b="0" i="0" kern="1200">
-                <a:solidFill>
-                  <a:schemeClr val="tx2"/>
-                </a:solidFill>
-                <a:latin typeface="+mj-lt"/>
-                <a:ea typeface="+mj-ea"/>
-                <a:cs typeface="+mj-cs"/>
-              </a:defRPr>
-            </a:lvl1pPr>
-            <a:lvl2pPr eaLnBrk="1" hangingPunct="1">
-              <a:defRPr>
-                <a:solidFill>
-                  <a:schemeClr val="tx2"/>
-                </a:solidFill>
-              </a:defRPr>
-            </a:lvl2pPr>
-            <a:lvl3pPr eaLnBrk="1" hangingPunct="1">
-              <a:defRPr>
-                <a:solidFill>
-                  <a:schemeClr val="tx2"/>
-                </a:solidFill>
-              </a:defRPr>
-            </a:lvl3pPr>
-            <a:lvl4pPr eaLnBrk="1" hangingPunct="1">
-              <a:defRPr>
-                <a:solidFill>
-                  <a:schemeClr val="tx2"/>
-                </a:solidFill>
-              </a:defRPr>
-            </a:lvl4pPr>
-            <a:lvl5pPr eaLnBrk="1" hangingPunct="1">
-              <a:defRPr>
-                <a:solidFill>
-                  <a:schemeClr val="tx2"/>
-                </a:solidFill>
-              </a:defRPr>
-            </a:lvl5pPr>
-            <a:lvl6pPr eaLnBrk="1" hangingPunct="1">
-              <a:defRPr>
-                <a:solidFill>
-                  <a:schemeClr val="tx2"/>
-                </a:solidFill>
-              </a:defRPr>
-            </a:lvl6pPr>
-            <a:lvl7pPr eaLnBrk="1" hangingPunct="1">
-              <a:defRPr>
-                <a:solidFill>
-                  <a:schemeClr val="tx2"/>
-                </a:solidFill>
-              </a:defRPr>
-            </a:lvl7pPr>
-            <a:lvl8pPr eaLnBrk="1" hangingPunct="1">
-              <a:defRPr>
-                <a:solidFill>
-                  <a:schemeClr val="tx2"/>
-                </a:solidFill>
-              </a:defRPr>
-            </a:lvl8pPr>
-            <a:lvl9pPr eaLnBrk="1" hangingPunct="1">
-              <a:defRPr>
-                <a:solidFill>
-                  <a:schemeClr val="tx2"/>
-                </a:solidFill>
-              </a:defRPr>
-            </a:lvl9pPr>
-          </a:lstStyle>
-          <a:p>
-            <a:r>
-              <a:rPr lang="es-AR" dirty="0" smtClean="0"/>
-              <a:t>Demo del sistema</a:t>
-            </a:r>
-            <a:endParaRPr lang="es-AR" dirty="0"/>
+          <a:bodyPr/>
+          <a:lstStyle/>
+          <a:p>
+            <a:r>
+              <a:rPr lang="es-AR" sz="3600" dirty="0" err="1" smtClean="0"/>
+              <a:t>Restrospectiva</a:t>
+            </a:r>
+            <a:r>
+              <a:rPr lang="es-AR" sz="3600" dirty="0" smtClean="0"/>
+              <a:t>  (Reflexión o Experiencias)</a:t>
+            </a:r>
+            <a:endParaRPr lang="es-AR" sz="3600" dirty="0"/>
           </a:p>
         </p:txBody>
       </p:sp>
       <p:pic>
         <p:nvPicPr>
-          <p:cNvPr id="29" name="Imagen 28"/>
+          <p:cNvPr id="56" name="Imagen 55"/>
           <p:cNvPicPr>
             <a:picLocks noChangeAspect="1"/>
           </p:cNvPicPr>
@@ -26446,7 +27329,7 @@
         </p:blipFill>
         <p:spPr>
           <a:xfrm>
-            <a:off x="289301" y="0"/>
+            <a:off x="365501" y="0"/>
             <a:ext cx="1151372" cy="1163031"/>
           </a:xfrm>
           <a:prstGeom prst="rect">
@@ -26456,146 +27339,60 @@
       </p:pic>
       <p:sp>
         <p:nvSpPr>
-          <p:cNvPr id="46" name="Título 1"/>
-          <p:cNvSpPr txBox="1">
-            <a:spLocks/>
-          </p:cNvSpPr>
+          <p:cNvPr id="101" name="Rectángulo redondeado 100"/>
+          <p:cNvSpPr/>
           <p:nvPr/>
         </p:nvSpPr>
         <p:spPr>
           <a:xfrm>
-            <a:off x="2061029" y="2257795"/>
-            <a:ext cx="8157028" cy="2342410"/>
+            <a:off x="1112397" y="1355611"/>
+            <a:ext cx="10397613" cy="5839536"/>
           </a:xfrm>
-          <a:prstGeom prst="rect">
-            <a:avLst/>
+          <a:prstGeom prst="roundRect">
+            <a:avLst>
+              <a:gd name="adj" fmla="val 2548"/>
+            </a:avLst>
           </a:prstGeom>
-          <a:effectLst>
-            <a:outerShdw blurRad="50800" dir="14400000">
-              <a:srgbClr val="000000">
-                <a:alpha val="60000"/>
-              </a:srgbClr>
-            </a:outerShdw>
-          </a:effectLst>
+          <a:solidFill>
+            <a:schemeClr val="tx2"/>
+          </a:solidFill>
+          <a:ln w="38100"/>
         </p:spPr>
+        <p:style>
+          <a:lnRef idx="2">
+            <a:schemeClr val="accent1">
+              <a:shade val="50000"/>
+            </a:schemeClr>
+          </a:lnRef>
+          <a:fillRef idx="1">
+            <a:schemeClr val="accent1"/>
+          </a:fillRef>
+          <a:effectRef idx="0">
+            <a:schemeClr val="accent1"/>
+          </a:effectRef>
+          <a:fontRef idx="minor">
+            <a:schemeClr val="lt1"/>
+          </a:fontRef>
+        </p:style>
         <p:txBody>
-          <a:bodyPr vert="horz" lIns="91440" tIns="45720" rIns="91440" bIns="45720" rtlCol="0" anchor="b">
-            <a:noAutofit/>
-          </a:bodyPr>
-          <a:lstStyle>
-            <a:lvl1pPr algn="l" defTabSz="457200" rtl="0" eaLnBrk="1" latinLnBrk="0" hangingPunct="1">
-              <a:spcBef>
-                <a:spcPct val="0"/>
-              </a:spcBef>
-              <a:buNone/>
-              <a:defRPr sz="5400" b="1" kern="1200">
-                <a:solidFill>
-                  <a:srgbClr val="FEFEFE"/>
-                </a:solidFill>
-                <a:latin typeface="+mj-lt"/>
-                <a:ea typeface="+mj-ea"/>
-                <a:cs typeface="+mj-cs"/>
-              </a:defRPr>
-            </a:lvl1pPr>
-            <a:lvl2pPr eaLnBrk="1" hangingPunct="1">
-              <a:defRPr>
-                <a:solidFill>
-                  <a:schemeClr val="tx2"/>
-                </a:solidFill>
-              </a:defRPr>
-            </a:lvl2pPr>
-            <a:lvl3pPr eaLnBrk="1" hangingPunct="1">
-              <a:defRPr>
-                <a:solidFill>
-                  <a:schemeClr val="tx2"/>
-                </a:solidFill>
-              </a:defRPr>
-            </a:lvl3pPr>
-            <a:lvl4pPr eaLnBrk="1" hangingPunct="1">
-              <a:defRPr>
-                <a:solidFill>
-                  <a:schemeClr val="tx2"/>
-                </a:solidFill>
-              </a:defRPr>
-            </a:lvl4pPr>
-            <a:lvl5pPr eaLnBrk="1" hangingPunct="1">
-              <a:defRPr>
-                <a:solidFill>
-                  <a:schemeClr val="tx2"/>
-                </a:solidFill>
-              </a:defRPr>
-            </a:lvl5pPr>
-            <a:lvl6pPr eaLnBrk="1" hangingPunct="1">
-              <a:defRPr>
-                <a:solidFill>
-                  <a:schemeClr val="tx2"/>
-                </a:solidFill>
-              </a:defRPr>
-            </a:lvl6pPr>
-            <a:lvl7pPr eaLnBrk="1" hangingPunct="1">
-              <a:defRPr>
-                <a:solidFill>
-                  <a:schemeClr val="tx2"/>
-                </a:solidFill>
-              </a:defRPr>
-            </a:lvl7pPr>
-            <a:lvl8pPr eaLnBrk="1" hangingPunct="1">
-              <a:defRPr>
-                <a:solidFill>
-                  <a:schemeClr val="tx2"/>
-                </a:solidFill>
-              </a:defRPr>
-            </a:lvl8pPr>
-            <a:lvl9pPr eaLnBrk="1" hangingPunct="1">
-              <a:defRPr>
-                <a:solidFill>
-                  <a:schemeClr val="tx2"/>
-                </a:solidFill>
-              </a:defRPr>
-            </a:lvl9pPr>
-          </a:lstStyle>
+          <a:bodyPr rtlCol="0" anchor="ctr"/>
+          <a:lstStyle/>
           <a:p>
             <a:pPr algn="ctr"/>
-            <a:r>
-              <a:rPr lang="es-AR" sz="7200" spc="300" dirty="0" smtClean="0">
-                <a:solidFill>
-                  <a:schemeClr val="tx1"/>
-                </a:solidFill>
-                <a:effectLst>
-                  <a:outerShdw blurRad="38100" dist="38100" dir="2700000" algn="tl">
-                    <a:srgbClr val="000000">
-                      <a:alpha val="43137"/>
-                    </a:srgbClr>
-                  </a:outerShdw>
-                </a:effectLst>
-              </a:rPr>
-              <a:t>Presentación de Funcionalidad </a:t>
-            </a:r>
-            <a:endParaRPr lang="es-AR" sz="7200" spc="300" dirty="0">
-              <a:solidFill>
-                <a:schemeClr val="tx1"/>
-              </a:solidFill>
-              <a:effectLst>
-                <a:outerShdw blurRad="38100" dist="38100" dir="2700000" algn="tl">
-                  <a:srgbClr val="000000">
-                    <a:alpha val="43137"/>
-                  </a:srgbClr>
-                </a:outerShdw>
-              </a:effectLst>
-            </a:endParaRPr>
+            <a:endParaRPr lang="es-ES"/>
           </a:p>
         </p:txBody>
       </p:sp>
       <p:sp>
         <p:nvSpPr>
-          <p:cNvPr id="47" name="Left Bracket"/>
+          <p:cNvPr id="3" name="CuadroTexto 2"/>
           <p:cNvSpPr txBox="1"/>
           <p:nvPr/>
         </p:nvSpPr>
         <p:spPr>
           <a:xfrm>
-            <a:off x="5163590" y="1741534"/>
-            <a:ext cx="1080745" cy="3154710"/>
+            <a:off x="1516873" y="1366641"/>
+            <a:ext cx="9588662" cy="7140416"/>
           </a:xfrm>
           <a:prstGeom prst="rect">
             <a:avLst/>
@@ -26603,104 +27400,442 @@
           <a:noFill/>
         </p:spPr>
         <p:txBody>
-          <a:bodyPr wrap="none" rtlCol="0">
+          <a:bodyPr wrap="square" rtlCol="0">
             <a:spAutoFit/>
           </a:bodyPr>
           <a:lstStyle/>
           <a:p>
-            <a:r>
-              <a:rPr lang="en-US" sz="19900" dirty="0" smtClean="0">
+            <a:pPr marL="285750" indent="-285750">
+              <a:buFont typeface="Arial" panose="020B0604020202020204" pitchFamily="34" charset="0"/>
+              <a:buChar char="•"/>
+            </a:pPr>
+            <a:r>
+              <a:rPr lang="es-AR" sz="1600" b="1" dirty="0" smtClean="0">
                 <a:solidFill>
-                  <a:schemeClr val="tx1">
-                    <a:lumMod val="95000"/>
-                  </a:schemeClr>
+                  <a:schemeClr val="bg1"/>
                 </a:solidFill>
-                <a:effectLst>
-                  <a:outerShdw blurRad="38100" dist="38100" dir="2700000" algn="tl">
-                    <a:srgbClr val="000000">
-                      <a:alpha val="43137"/>
-                    </a:srgbClr>
-                  </a:outerShdw>
-                </a:effectLst>
               </a:rPr>
-              <a:t>[</a:t>
-            </a:r>
-            <a:endParaRPr lang="en-US" sz="19900" dirty="0">
+              <a:t>(+)Cantidad Horas trabajadas</a:t>
+            </a:r>
+          </a:p>
+          <a:p>
+            <a:pPr marL="285750" indent="-285750">
+              <a:buFont typeface="Arial" panose="020B0604020202020204" pitchFamily="34" charset="0"/>
+              <a:buChar char="•"/>
+            </a:pPr>
+            <a:r>
+              <a:rPr lang="es-AR" sz="1600" b="1" dirty="0" smtClean="0">
+                <a:solidFill>
+                  <a:schemeClr val="bg1"/>
+                </a:solidFill>
+              </a:rPr>
+              <a:t>Metodología -&gt; </a:t>
+            </a:r>
+            <a:r>
+              <a:rPr lang="es-AR" sz="1600" b="1" dirty="0" err="1" smtClean="0">
+                <a:solidFill>
+                  <a:schemeClr val="bg1"/>
+                </a:solidFill>
+              </a:rPr>
+              <a:t>Scrum</a:t>
+            </a:r>
+            <a:r>
+              <a:rPr lang="es-AR" sz="1600" b="1" dirty="0" smtClean="0">
+                <a:solidFill>
+                  <a:schemeClr val="bg1"/>
+                </a:solidFill>
+              </a:rPr>
+              <a:t>. Tomamos las practicas que nos servían a nosotros.</a:t>
+            </a:r>
+          </a:p>
+          <a:p>
+            <a:pPr marL="285750" indent="-285750">
+              <a:buFont typeface="Arial" panose="020B0604020202020204" pitchFamily="34" charset="0"/>
+              <a:buChar char="•"/>
+            </a:pPr>
+            <a:r>
+              <a:rPr lang="es-AR" sz="1600" b="1" dirty="0" smtClean="0">
+                <a:solidFill>
+                  <a:schemeClr val="bg1"/>
+                </a:solidFill>
+              </a:rPr>
+              <a:t>TRABAJO EN EQUIPO! COMPROMISO! Mejoro la comunicación, siempre estuvimos juntos físicamente en el mismo lugar. -&gt; Avanzar mucho mas rápido y reduce el re trabajo. </a:t>
+            </a:r>
+          </a:p>
+          <a:p>
+            <a:pPr marL="285750" indent="-285750">
+              <a:buFont typeface="Arial" panose="020B0604020202020204" pitchFamily="34" charset="0"/>
+              <a:buChar char="•"/>
+            </a:pPr>
+            <a:r>
+              <a:rPr lang="es-AR" sz="1600" b="1" dirty="0" smtClean="0">
+                <a:solidFill>
+                  <a:schemeClr val="bg1"/>
+                </a:solidFill>
+              </a:rPr>
+              <a:t>Se respetó la planificación. Se le dedico las horas </a:t>
+            </a:r>
+            <a:r>
+              <a:rPr lang="es-AR" sz="1600" b="1" dirty="0" err="1" smtClean="0">
+                <a:solidFill>
+                  <a:schemeClr val="bg1"/>
+                </a:solidFill>
+              </a:rPr>
+              <a:t>semanals</a:t>
+            </a:r>
+            <a:r>
+              <a:rPr lang="es-AR" sz="1600" b="1" dirty="0" smtClean="0">
+                <a:solidFill>
+                  <a:schemeClr val="bg1"/>
+                </a:solidFill>
+              </a:rPr>
+              <a:t> acordadas</a:t>
+            </a:r>
+          </a:p>
+          <a:p>
+            <a:pPr marL="285750" indent="-285750">
+              <a:buFont typeface="Arial" panose="020B0604020202020204" pitchFamily="34" charset="0"/>
+              <a:buChar char="•"/>
+            </a:pPr>
+            <a:r>
+              <a:rPr lang="es-AR" sz="1600" b="1" dirty="0" smtClean="0">
+                <a:solidFill>
+                  <a:schemeClr val="bg1"/>
+                </a:solidFill>
+              </a:rPr>
+              <a:t>Nos sirvió realizar el estudio inicial y analizar los </a:t>
+            </a:r>
+            <a:r>
+              <a:rPr lang="es-AR" sz="1600" b="1" dirty="0" err="1" smtClean="0">
+                <a:solidFill>
+                  <a:schemeClr val="bg1"/>
+                </a:solidFill>
+              </a:rPr>
+              <a:t>rqs</a:t>
+            </a:r>
+            <a:r>
+              <a:rPr lang="es-AR" sz="1600" b="1" dirty="0" smtClean="0">
+                <a:solidFill>
+                  <a:schemeClr val="bg1"/>
+                </a:solidFill>
+              </a:rPr>
+              <a:t> antes de programar (analizar bien el dominio, </a:t>
+            </a:r>
+            <a:r>
+              <a:rPr lang="es-AR" sz="1600" b="1" dirty="0" err="1" smtClean="0">
+                <a:solidFill>
+                  <a:schemeClr val="bg1"/>
+                </a:solidFill>
+              </a:rPr>
+              <a:t>nors</a:t>
+            </a:r>
+            <a:r>
+              <a:rPr lang="es-AR" sz="1600" b="1" dirty="0" smtClean="0">
+                <a:solidFill>
+                  <a:schemeClr val="bg1"/>
+                </a:solidFill>
+              </a:rPr>
+              <a:t> sirvió tomarnos dos meses – sprint 0) ANALIZAR NECESIDADES, RQS, COMO ENCARAR LA SOLUCION.. </a:t>
+            </a:r>
+          </a:p>
+          <a:p>
+            <a:pPr marL="285750" indent="-285750">
+              <a:buFont typeface="Arial" panose="020B0604020202020204" pitchFamily="34" charset="0"/>
+              <a:buChar char="•"/>
+            </a:pPr>
+            <a:r>
+              <a:rPr lang="es-AR" sz="1600" b="1" dirty="0" err="1" smtClean="0">
+                <a:solidFill>
+                  <a:schemeClr val="bg1"/>
+                </a:solidFill>
+              </a:rPr>
+              <a:t>Restruccturacion</a:t>
+            </a:r>
+            <a:r>
+              <a:rPr lang="es-AR" sz="1600" b="1" dirty="0" smtClean="0">
+                <a:solidFill>
+                  <a:schemeClr val="bg1"/>
+                </a:solidFill>
+              </a:rPr>
+              <a:t> de código -&gt; se le dedico tiempo. Un sprint</a:t>
+            </a:r>
+          </a:p>
+          <a:p>
+            <a:pPr marL="285750" indent="-285750">
+              <a:buFont typeface="Arial" panose="020B0604020202020204" pitchFamily="34" charset="0"/>
+              <a:buChar char="•"/>
+            </a:pPr>
+            <a:r>
+              <a:rPr lang="es-AR" sz="1600" b="1" dirty="0" smtClean="0">
+                <a:solidFill>
+                  <a:schemeClr val="bg1"/>
+                </a:solidFill>
+              </a:rPr>
+              <a:t>Tenemos la </a:t>
+            </a:r>
+            <a:r>
+              <a:rPr lang="es-AR" sz="1600" b="1" dirty="0" err="1" smtClean="0">
+                <a:solidFill>
+                  <a:schemeClr val="bg1"/>
+                </a:solidFill>
+              </a:rPr>
+              <a:t>doc</a:t>
+            </a:r>
+            <a:r>
+              <a:rPr lang="es-AR" sz="1600" b="1" dirty="0" smtClean="0">
+                <a:solidFill>
+                  <a:schemeClr val="bg1"/>
+                </a:solidFill>
+              </a:rPr>
+              <a:t> actualizada y consistente nos facilito la construcción de nuestro producto y eso va a ayudarnos en un futuro para el mantenimiento.</a:t>
+            </a:r>
+          </a:p>
+          <a:p>
+            <a:pPr marL="285750" indent="-285750">
+              <a:buFont typeface="Arial" panose="020B0604020202020204" pitchFamily="34" charset="0"/>
+              <a:buChar char="•"/>
+            </a:pPr>
+            <a:endParaRPr lang="es-AR" b="1" dirty="0">
               <a:solidFill>
-                <a:schemeClr val="tx1">
-                  <a:lumMod val="95000"/>
-                </a:schemeClr>
+                <a:schemeClr val="bg1"/>
               </a:solidFill>
-              <a:effectLst>
-                <a:outerShdw blurRad="38100" dist="38100" dir="2700000" algn="tl">
-                  <a:srgbClr val="000000">
-                    <a:alpha val="43137"/>
-                  </a:srgbClr>
-                </a:outerShdw>
-              </a:effectLst>
             </a:endParaRPr>
           </a:p>
-        </p:txBody>
-      </p:sp>
-      <p:sp>
-        <p:nvSpPr>
-          <p:cNvPr id="48" name="Right Bracket"/>
-          <p:cNvSpPr txBox="1"/>
-          <p:nvPr/>
-        </p:nvSpPr>
-        <p:spPr>
-          <a:xfrm>
-            <a:off x="6230113" y="1741534"/>
-            <a:ext cx="1080745" cy="3154710"/>
-          </a:xfrm>
-          <a:prstGeom prst="rect">
-            <a:avLst/>
-          </a:prstGeom>
-          <a:noFill/>
-        </p:spPr>
-        <p:txBody>
-          <a:bodyPr wrap="none" rtlCol="0">
-            <a:spAutoFit/>
-          </a:bodyPr>
-          <a:lstStyle/>
-          <a:p>
-            <a:r>
-              <a:rPr lang="en-US" sz="19900" dirty="0">
+          <a:p>
+            <a:pPr marL="285750" indent="-285750">
+              <a:buFont typeface="Arial" panose="020B0604020202020204" pitchFamily="34" charset="0"/>
+              <a:buChar char="•"/>
+            </a:pPr>
+            <a:r>
+              <a:rPr lang="es-AR" sz="1600" b="1" dirty="0" smtClean="0">
                 <a:solidFill>
-                  <a:schemeClr val="tx1">
-                    <a:lumMod val="95000"/>
-                  </a:schemeClr>
+                  <a:schemeClr val="bg1"/>
                 </a:solidFill>
-                <a:effectLst>
-                  <a:outerShdw blurRad="38100" dist="38100" dir="2700000" algn="tl">
-                    <a:srgbClr val="000000">
-                      <a:alpha val="43137"/>
-                    </a:srgbClr>
-                  </a:outerShdw>
-                </a:effectLst>
               </a:rPr>
-              <a:t>]</a:t>
-            </a:r>
+              <a:t>(-)Nos falto definir con detalle un Criterio de Hecho (Nos faltó un </a:t>
+            </a:r>
+            <a:r>
+              <a:rPr lang="es-AR" sz="1600" b="1" dirty="0" err="1" smtClean="0">
+                <a:solidFill>
+                  <a:schemeClr val="bg1"/>
+                </a:solidFill>
+              </a:rPr>
+              <a:t>product</a:t>
+            </a:r>
+            <a:r>
+              <a:rPr lang="es-AR" sz="1600" b="1" dirty="0" smtClean="0">
+                <a:solidFill>
+                  <a:schemeClr val="bg1"/>
+                </a:solidFill>
+              </a:rPr>
+              <a:t> </a:t>
+            </a:r>
+            <a:r>
+              <a:rPr lang="es-AR" sz="1600" b="1" dirty="0" err="1" smtClean="0">
+                <a:solidFill>
+                  <a:schemeClr val="bg1"/>
+                </a:solidFill>
+              </a:rPr>
+              <a:t>owner</a:t>
+            </a:r>
+            <a:r>
+              <a:rPr lang="es-AR" sz="1600" b="1" dirty="0" smtClean="0">
+                <a:solidFill>
+                  <a:schemeClr val="bg1"/>
+                </a:solidFill>
+              </a:rPr>
+              <a:t> mas formal). Definir un punto de cuando las cosas están listas.</a:t>
+            </a:r>
+          </a:p>
+          <a:p>
+            <a:pPr marL="285750" indent="-285750">
+              <a:buFont typeface="Arial" panose="020B0604020202020204" pitchFamily="34" charset="0"/>
+              <a:buChar char="•"/>
+            </a:pPr>
+            <a:r>
+              <a:rPr lang="es-AR" sz="1600" b="1" dirty="0" err="1" smtClean="0">
+                <a:solidFill>
+                  <a:schemeClr val="bg1"/>
+                </a:solidFill>
+              </a:rPr>
+              <a:t>Testing</a:t>
+            </a:r>
+            <a:r>
+              <a:rPr lang="es-AR" sz="1600" b="1" dirty="0" smtClean="0">
+                <a:solidFill>
+                  <a:schemeClr val="bg1"/>
+                </a:solidFill>
+              </a:rPr>
+              <a:t>!!!!!! No le dedicamos tiempo a la automatización de CP que era la idea inicial. Hicimos </a:t>
+            </a:r>
+            <a:r>
+              <a:rPr lang="es-AR" sz="1600" b="1" dirty="0" err="1" smtClean="0">
+                <a:solidFill>
+                  <a:schemeClr val="bg1"/>
+                </a:solidFill>
+              </a:rPr>
+              <a:t>testing</a:t>
+            </a:r>
+            <a:r>
+              <a:rPr lang="es-AR" sz="1600" b="1" dirty="0" smtClean="0">
+                <a:solidFill>
+                  <a:schemeClr val="bg1"/>
+                </a:solidFill>
+              </a:rPr>
+              <a:t> manual solo. </a:t>
+            </a:r>
+          </a:p>
+          <a:p>
+            <a:pPr marL="285750" indent="-285750">
+              <a:buFont typeface="Arial" panose="020B0604020202020204" pitchFamily="34" charset="0"/>
+              <a:buChar char="•"/>
+            </a:pPr>
+            <a:r>
+              <a:rPr lang="es-AR" sz="1600" b="1" dirty="0" smtClean="0">
+                <a:solidFill>
+                  <a:schemeClr val="bg1"/>
+                </a:solidFill>
+              </a:rPr>
+              <a:t>Le deberíamos haber dado más importancia a las inspecciones de </a:t>
+            </a:r>
+            <a:r>
+              <a:rPr lang="es-AR" sz="1600" b="1" smtClean="0">
+                <a:solidFill>
+                  <a:schemeClr val="bg1"/>
+                </a:solidFill>
+              </a:rPr>
+              <a:t>código.</a:t>
+            </a:r>
+            <a:endParaRPr lang="es-AR" sz="1600" b="1" dirty="0">
+              <a:solidFill>
+                <a:schemeClr val="bg1"/>
+              </a:solidFill>
+            </a:endParaRPr>
+          </a:p>
+          <a:p>
+            <a:pPr marL="285750" indent="-285750">
+              <a:buFont typeface="Arial" panose="020B0604020202020204" pitchFamily="34" charset="0"/>
+              <a:buChar char="•"/>
+            </a:pPr>
+            <a:endParaRPr lang="es-AR" sz="1600" b="1" dirty="0" smtClean="0">
+              <a:solidFill>
+                <a:schemeClr val="bg1"/>
+              </a:solidFill>
+            </a:endParaRPr>
+          </a:p>
+          <a:p>
+            <a:pPr marL="285750" indent="-285750">
+              <a:buFont typeface="Arial" panose="020B0604020202020204" pitchFamily="34" charset="0"/>
+              <a:buChar char="•"/>
+            </a:pPr>
+            <a:r>
+              <a:rPr lang="es-AR" sz="1600" b="1" dirty="0" smtClean="0">
+                <a:solidFill>
+                  <a:schemeClr val="bg1"/>
+                </a:solidFill>
+              </a:rPr>
+              <a:t>Mejorar (++)</a:t>
+            </a:r>
+          </a:p>
+          <a:p>
+            <a:pPr marL="285750" indent="-285750">
+              <a:buFont typeface="Arial" panose="020B0604020202020204" pitchFamily="34" charset="0"/>
+              <a:buChar char="•"/>
+            </a:pPr>
+            <a:r>
+              <a:rPr lang="es-AR" sz="1600" b="1" dirty="0" smtClean="0">
+                <a:solidFill>
+                  <a:schemeClr val="bg1"/>
+                </a:solidFill>
+              </a:rPr>
+              <a:t>Como vamos a seguir.. Como forma de trabajo.. Dedicarle mas horas a trabajar juntos (Seguir trabajando con las cosas positivas y tratar de mejorar en los aspectos negativos)</a:t>
+            </a:r>
+          </a:p>
+          <a:p>
+            <a:pPr marL="285750" indent="-285750">
+              <a:buFont typeface="Arial" panose="020B0604020202020204" pitchFamily="34" charset="0"/>
+              <a:buChar char="•"/>
+            </a:pPr>
+            <a:r>
+              <a:rPr lang="es-AR" sz="1600" b="1" dirty="0" smtClean="0">
+                <a:solidFill>
+                  <a:schemeClr val="bg1"/>
+                </a:solidFill>
+              </a:rPr>
+              <a:t>Hoy lo vemos como algo mucho mas factible y nos gustaría arrancar un emprendimiento propio y por tal motivo hicimos un PLAN DE NEGOCIO!!!! (</a:t>
+            </a:r>
+            <a:r>
+              <a:rPr lang="es-AR" sz="1600" b="1" dirty="0" err="1" smtClean="0">
+                <a:solidFill>
+                  <a:schemeClr val="bg1"/>
+                </a:solidFill>
+              </a:rPr>
+              <a:t>fACU</a:t>
+            </a:r>
+            <a:r>
+              <a:rPr lang="es-AR" sz="1600" b="1" dirty="0" smtClean="0">
+                <a:solidFill>
+                  <a:schemeClr val="bg1"/>
+                </a:solidFill>
+              </a:rPr>
+              <a:t>)</a:t>
+            </a:r>
+          </a:p>
+          <a:p>
+            <a:pPr marL="285750" indent="-285750">
+              <a:buFont typeface="Arial" panose="020B0604020202020204" pitchFamily="34" charset="0"/>
+              <a:buChar char="•"/>
+            </a:pPr>
+            <a:endParaRPr lang="es-AR" b="1" dirty="0" smtClean="0">
+              <a:solidFill>
+                <a:schemeClr val="bg1"/>
+              </a:solidFill>
+            </a:endParaRPr>
+          </a:p>
+          <a:p>
+            <a:pPr marL="285750" indent="-285750">
+              <a:buFont typeface="Arial" panose="020B0604020202020204" pitchFamily="34" charset="0"/>
+              <a:buChar char="•"/>
+            </a:pPr>
+            <a:endParaRPr lang="es-AR" b="1" dirty="0" smtClean="0">
+              <a:solidFill>
+                <a:schemeClr val="bg1"/>
+              </a:solidFill>
+            </a:endParaRPr>
+          </a:p>
+          <a:p>
+            <a:pPr marL="285750" indent="-285750">
+              <a:buFont typeface="Arial" panose="020B0604020202020204" pitchFamily="34" charset="0"/>
+              <a:buChar char="•"/>
+            </a:pPr>
+            <a:endParaRPr lang="es-AR" dirty="0" smtClean="0"/>
+          </a:p>
+          <a:p>
+            <a:pPr marL="285750" indent="-285750">
+              <a:buFont typeface="Arial" panose="020B0604020202020204" pitchFamily="34" charset="0"/>
+              <a:buChar char="•"/>
+            </a:pPr>
+            <a:endParaRPr lang="es-ES" dirty="0"/>
           </a:p>
         </p:txBody>
       </p:sp>
     </p:spTree>
     <p:extLst>
       <p:ext uri="{BB962C8B-B14F-4D97-AF65-F5344CB8AC3E}">
-        <p14:creationId xmlns:p14="http://schemas.microsoft.com/office/powerpoint/2010/main" val="3189637303"/>
+        <p14:creationId xmlns:p14="http://schemas.microsoft.com/office/powerpoint/2010/main" val="704355331"/>
       </p:ext>
     </p:extLst>
   </p:cSld>
   <p:clrMapOvr>
     <a:masterClrMapping/>
   </p:clrMapOvr>
-  <mc:AlternateContent xmlns:mc="http://schemas.openxmlformats.org/markup-compatibility/2006" xmlns:p14="http://schemas.microsoft.com/office/powerpoint/2010/main">
-    <mc:Choice Requires="p14">
+  <mc:AlternateContent xmlns:mc="http://schemas.openxmlformats.org/markup-compatibility/2006">
+    <mc:Choice xmlns:p14="http://schemas.microsoft.com/office/powerpoint/2010/main" Requires="p14">
       <p:transition spd="slow" p14:dur="800">
         <p14:flythrough/>
       </p:transition>
     </mc:Choice>
-    <mc:Fallback xmlns="">
+    <mc:Fallback>
       <p:transition spd="slow">
         <p:fade/>
       </p:transition>
@@ -26709,215 +27844,9 @@
   <p:timing>
     <p:tnLst>
       <p:par>
-        <p:cTn id="1" dur="indefinite" restart="never" nodeType="tmRoot">
-          <p:childTnLst>
-            <p:seq concurrent="1" nextAc="seek">
-              <p:cTn id="2" dur="indefinite" nodeType="mainSeq">
-                <p:childTnLst>
-                  <p:par>
-                    <p:cTn id="3" fill="hold">
-                      <p:stCondLst>
-                        <p:cond delay="indefinite"/>
-                      </p:stCondLst>
-                      <p:childTnLst>
-                        <p:par>
-                          <p:cTn id="4" fill="hold">
-                            <p:stCondLst>
-                              <p:cond delay="0"/>
-                            </p:stCondLst>
-                            <p:childTnLst>
-                              <p:par>
-                                <p:cTn id="5" presetID="10" presetClass="entr" presetSubtype="0" fill="hold" grpId="0" nodeType="clickEffect">
-                                  <p:stCondLst>
-                                    <p:cond delay="500"/>
-                                  </p:stCondLst>
-                                  <p:childTnLst>
-                                    <p:set>
-                                      <p:cBhvr>
-                                        <p:cTn id="6" dur="1" fill="hold">
-                                          <p:stCondLst>
-                                            <p:cond delay="0"/>
-                                          </p:stCondLst>
-                                        </p:cTn>
-                                        <p:tgtEl>
-                                          <p:spTgt spid="48"/>
-                                        </p:tgtEl>
-                                        <p:attrNameLst>
-                                          <p:attrName>style.visibility</p:attrName>
-                                        </p:attrNameLst>
-                                      </p:cBhvr>
-                                      <p:to>
-                                        <p:strVal val="visible"/>
-                                      </p:to>
-                                    </p:set>
-                                    <p:animEffect transition="in" filter="fade">
-                                      <p:cBhvr>
-                                        <p:cTn id="7" dur="500"/>
-                                        <p:tgtEl>
-                                          <p:spTgt spid="48"/>
-                                        </p:tgtEl>
-                                      </p:cBhvr>
-                                    </p:animEffect>
-                                  </p:childTnLst>
-                                </p:cTn>
-                              </p:par>
-                              <p:par>
-                                <p:cTn id="8" presetID="10" presetClass="entr" presetSubtype="0" fill="hold" grpId="1" nodeType="withEffect">
-                                  <p:stCondLst>
-                                    <p:cond delay="500"/>
-                                  </p:stCondLst>
-                                  <p:childTnLst>
-                                    <p:set>
-                                      <p:cBhvr>
-                                        <p:cTn id="9" dur="1" fill="hold">
-                                          <p:stCondLst>
-                                            <p:cond delay="0"/>
-                                          </p:stCondLst>
-                                        </p:cTn>
-                                        <p:tgtEl>
-                                          <p:spTgt spid="47"/>
-                                        </p:tgtEl>
-                                        <p:attrNameLst>
-                                          <p:attrName>style.visibility</p:attrName>
-                                        </p:attrNameLst>
-                                      </p:cBhvr>
-                                      <p:to>
-                                        <p:strVal val="visible"/>
-                                      </p:to>
-                                    </p:set>
-                                    <p:animEffect transition="in" filter="fade">
-                                      <p:cBhvr>
-                                        <p:cTn id="10" dur="500"/>
-                                        <p:tgtEl>
-                                          <p:spTgt spid="47"/>
-                                        </p:tgtEl>
-                                      </p:cBhvr>
-                                    </p:animEffect>
-                                  </p:childTnLst>
-                                </p:cTn>
-                              </p:par>
-                            </p:childTnLst>
-                          </p:cTn>
-                        </p:par>
-                        <p:par>
-                          <p:cTn id="11" fill="hold">
-                            <p:stCondLst>
-                              <p:cond delay="1000"/>
-                            </p:stCondLst>
-                            <p:childTnLst>
-                              <p:par>
-                                <p:cTn id="12" presetID="42" presetClass="path" presetSubtype="0" accel="50000" decel="50000" fill="hold" grpId="0" nodeType="afterEffect">
-                                  <p:stCondLst>
-                                    <p:cond delay="0"/>
-                                  </p:stCondLst>
-                                  <p:childTnLst>
-                                    <p:animMotion origin="layout" path="M 1.45833E-6 3.7037E-6 L -0.3069 -0.00324 " pathEditMode="relative" rAng="0" ptsTypes="AA">
-                                      <p:cBhvr>
-                                        <p:cTn id="13" dur="1000" fill="hold"/>
-                                        <p:tgtEl>
-                                          <p:spTgt spid="47"/>
-                                        </p:tgtEl>
-                                        <p:attrNameLst>
-                                          <p:attrName>ppt_x</p:attrName>
-                                          <p:attrName>ppt_y</p:attrName>
-                                        </p:attrNameLst>
-                                      </p:cBhvr>
-                                      <p:rCtr x="-15352" y="-162"/>
-                                    </p:animMotion>
-                                  </p:childTnLst>
-                                </p:cTn>
-                              </p:par>
-                              <p:par>
-                                <p:cTn id="14" presetID="42" presetClass="path" presetSubtype="0" accel="50000" decel="50000" fill="hold" grpId="1" nodeType="withEffect">
-                                  <p:stCondLst>
-                                    <p:cond delay="0"/>
-                                  </p:stCondLst>
-                                  <p:childTnLst>
-                                    <p:animMotion origin="layout" path="M 1.66667E-6 3.7037E-6 L 0.28698 0.00231 " pathEditMode="relative" rAng="0" ptsTypes="AA">
-                                      <p:cBhvr>
-                                        <p:cTn id="15" dur="1100" fill="hold"/>
-                                        <p:tgtEl>
-                                          <p:spTgt spid="48"/>
-                                        </p:tgtEl>
-                                        <p:attrNameLst>
-                                          <p:attrName>ppt_x</p:attrName>
-                                          <p:attrName>ppt_y</p:attrName>
-                                        </p:attrNameLst>
-                                      </p:cBhvr>
-                                      <p:rCtr x="14349" y="116"/>
-                                    </p:animMotion>
-                                  </p:childTnLst>
-                                </p:cTn>
-                              </p:par>
-                              <p:par>
-                                <p:cTn id="16" presetID="16" presetClass="entr" presetSubtype="37" fill="hold" grpId="0" nodeType="withEffect">
-                                  <p:stCondLst>
-                                    <p:cond delay="200"/>
-                                  </p:stCondLst>
-                                  <p:childTnLst>
-                                    <p:set>
-                                      <p:cBhvr>
-                                        <p:cTn id="17" dur="1" fill="hold">
-                                          <p:stCondLst>
-                                            <p:cond delay="0"/>
-                                          </p:stCondLst>
-                                        </p:cTn>
-                                        <p:tgtEl>
-                                          <p:spTgt spid="46"/>
-                                        </p:tgtEl>
-                                        <p:attrNameLst>
-                                          <p:attrName>style.visibility</p:attrName>
-                                        </p:attrNameLst>
-                                      </p:cBhvr>
-                                      <p:to>
-                                        <p:strVal val="visible"/>
-                                      </p:to>
-                                    </p:set>
-                                    <p:animEffect transition="in" filter="barn(outVertical)">
-                                      <p:cBhvr>
-                                        <p:cTn id="18" dur="800"/>
-                                        <p:tgtEl>
-                                          <p:spTgt spid="46"/>
-                                        </p:tgtEl>
-                                      </p:cBhvr>
-                                    </p:animEffect>
-                                  </p:childTnLst>
-                                </p:cTn>
-                              </p:par>
-                            </p:childTnLst>
-                          </p:cTn>
-                        </p:par>
-                      </p:childTnLst>
-                    </p:cTn>
-                  </p:par>
-                </p:childTnLst>
-              </p:cTn>
-              <p:prevCondLst>
-                <p:cond evt="onPrev" delay="0">
-                  <p:tgtEl>
-                    <p:sldTgt/>
-                  </p:tgtEl>
-                </p:cond>
-              </p:prevCondLst>
-              <p:nextCondLst>
-                <p:cond evt="onNext" delay="0">
-                  <p:tgtEl>
-                    <p:sldTgt/>
-                  </p:tgtEl>
-                </p:cond>
-              </p:nextCondLst>
-            </p:seq>
-          </p:childTnLst>
-        </p:cTn>
+        <p:cTn id="1" dur="indefinite" restart="never" nodeType="tmRoot"/>
       </p:par>
     </p:tnLst>
-    <p:bldLst>
-      <p:bldP spid="46" grpId="0"/>
-      <p:bldP spid="47" grpId="0"/>
-      <p:bldP spid="47" grpId="1"/>
-      <p:bldP spid="48" grpId="0"/>
-      <p:bldP spid="48" grpId="1"/>
-    </p:bldLst>
   </p:timing>
 </p:sld>
 </file>

</xml_diff>